<commit_message>
Fix PPTX text overlap and add design best practices
- Fix Exit Ticket header: title and metadata now on separate lines
- Fix all station intro headers: consistent two-line pattern
- Fix Prior Knowledge title: reduced font size to prevent wrapping
- Add MSO_ANCHOR support to add_text_box for vertical centering
- Add comprehensive PPTX design best practices documentation

Best practices documented:
- Text box positioning and padding requirements
- Title + metadata separation pattern
- Text wrapping prevention guidelines
- Vertical centering in constrained height boxes
- Standard layout measurements for consistency
</commit_message>
<xml_diff>
--- a/content/grade7/cycle03/week2/G7_C3_W2_Feedback_Loops_Slides_Final.pptx
+++ b/content/grade7/cycle03/week2/G7_C3_W2_Feedback_Loops_Slides_Final.pptx
@@ -4156,7 +4156,7 @@
         <p:spPr>
           <a:xfrm>
             <a:off x="137160" y="137160"/>
-            <a:ext cx="8869680" cy="685800"/>
+            <a:ext cx="8869680" cy="777240"/>
           </a:xfrm>
           <a:prstGeom prst="roundRect">
             <a:avLst/>
@@ -4198,8 +4198,8 @@
         </p:nvSpPr>
         <p:spPr>
           <a:xfrm>
-            <a:off x="320040" y="228600"/>
-            <a:ext cx="8503920" cy="502920"/>
+            <a:off x="320040" y="182880"/>
+            <a:ext cx="8503920" cy="411480"/>
           </a:xfrm>
           <a:prstGeom prst="rect">
             <a:avLst/>
@@ -4213,7 +4213,7 @@
           <a:lstStyle/>
           <a:p>
             <a:pPr algn="ctr">
-              <a:defRPr sz="2800" b="1">
+              <a:defRPr sz="2600" b="1">
                 <a:solidFill>
                   <a:srgbClr val="FFFFFF"/>
                 </a:solidFill>
@@ -4234,21 +4234,21 @@
         </p:nvSpPr>
         <p:spPr>
           <a:xfrm>
-            <a:off x="6858000" y="502920"/>
-            <a:ext cx="1828800" cy="274320"/>
-          </a:xfrm>
-          <a:prstGeom prst="rect">
-            <a:avLst/>
-          </a:prstGeom>
-          <a:noFill/>
-        </p:spPr>
-        <p:txBody>
-          <a:bodyPr wrap="square">
-            <a:spAutoFit/>
-          </a:bodyPr>
-          <a:lstStyle/>
-          <a:p>
-            <a:pPr algn="l">
+            <a:off x="320040" y="594360"/>
+            <a:ext cx="8503920" cy="274320"/>
+          </a:xfrm>
+          <a:prstGeom prst="rect">
+            <a:avLst/>
+          </a:prstGeom>
+          <a:noFill/>
+        </p:spPr>
+        <p:txBody>
+          <a:bodyPr wrap="square">
+            <a:spAutoFit/>
+          </a:bodyPr>
+          <a:lstStyle/>
+          <a:p>
+            <a:pPr algn="ctr">
               <a:defRPr sz="1100" b="0">
                 <a:solidFill>
                   <a:srgbClr val="FFFFFF"/>
@@ -5613,7 +5613,7 @@
         <p:spPr>
           <a:xfrm>
             <a:off x="137160" y="137160"/>
-            <a:ext cx="8869680" cy="685800"/>
+            <a:ext cx="8869680" cy="777240"/>
           </a:xfrm>
           <a:prstGeom prst="roundRect">
             <a:avLst/>
@@ -5655,8 +5655,8 @@
         </p:nvSpPr>
         <p:spPr>
           <a:xfrm>
-            <a:off x="320040" y="228600"/>
-            <a:ext cx="8503920" cy="502920"/>
+            <a:off x="320040" y="182880"/>
+            <a:ext cx="8503920" cy="411480"/>
           </a:xfrm>
           <a:prstGeom prst="rect">
             <a:avLst/>
@@ -5670,7 +5670,7 @@
           <a:lstStyle/>
           <a:p>
             <a:pPr algn="ctr">
-              <a:defRPr sz="2800" b="1">
+              <a:defRPr sz="2600" b="1">
                 <a:solidFill>
                   <a:srgbClr val="FFFFFF"/>
                 </a:solidFill>
@@ -5691,21 +5691,21 @@
         </p:nvSpPr>
         <p:spPr>
           <a:xfrm>
-            <a:off x="6583680" y="502920"/>
-            <a:ext cx="2103120" cy="274320"/>
-          </a:xfrm>
-          <a:prstGeom prst="rect">
-            <a:avLst/>
-          </a:prstGeom>
-          <a:noFill/>
-        </p:spPr>
-        <p:txBody>
-          <a:bodyPr wrap="square">
-            <a:spAutoFit/>
-          </a:bodyPr>
-          <a:lstStyle/>
-          <a:p>
-            <a:pPr algn="l">
+            <a:off x="320040" y="594360"/>
+            <a:ext cx="8503920" cy="274320"/>
+          </a:xfrm>
+          <a:prstGeom prst="rect">
+            <a:avLst/>
+          </a:prstGeom>
+          <a:noFill/>
+        </p:spPr>
+        <p:txBody>
+          <a:bodyPr wrap="square">
+            <a:spAutoFit/>
+          </a:bodyPr>
+          <a:lstStyle/>
+          <a:p>
+            <a:pPr algn="ctr">
               <a:defRPr sz="1100" b="0">
                 <a:solidFill>
                   <a:srgbClr val="FFFFFF"/>
@@ -7314,7 +7314,7 @@
         <p:spPr>
           <a:xfrm>
             <a:off x="137160" y="137160"/>
-            <a:ext cx="8869680" cy="685800"/>
+            <a:ext cx="8869680" cy="822960"/>
           </a:xfrm>
           <a:prstGeom prst="roundRect">
             <a:avLst/>
@@ -7356,8 +7356,8 @@
         </p:nvSpPr>
         <p:spPr>
           <a:xfrm>
-            <a:off x="320040" y="228600"/>
-            <a:ext cx="8503920" cy="502920"/>
+            <a:off x="320040" y="182880"/>
+            <a:ext cx="8503920" cy="457200"/>
           </a:xfrm>
           <a:prstGeom prst="rect">
             <a:avLst/>
@@ -7371,7 +7371,7 @@
           <a:lstStyle/>
           <a:p>
             <a:pPr algn="ctr">
-              <a:defRPr sz="2800" b="1">
+              <a:defRPr sz="2600" b="1">
                 <a:solidFill>
                   <a:srgbClr val="FFFFFF"/>
                 </a:solidFill>
@@ -7392,22 +7392,22 @@
         </p:nvSpPr>
         <p:spPr>
           <a:xfrm>
-            <a:off x="6858000" y="502920"/>
-            <a:ext cx="1828800" cy="274320"/>
-          </a:xfrm>
-          <a:prstGeom prst="rect">
-            <a:avLst/>
-          </a:prstGeom>
-          <a:noFill/>
-        </p:spPr>
-        <p:txBody>
-          <a:bodyPr wrap="square">
-            <a:spAutoFit/>
-          </a:bodyPr>
-          <a:lstStyle/>
-          <a:p>
-            <a:pPr algn="l">
-              <a:defRPr sz="1100" b="0">
+            <a:off x="320040" y="640080"/>
+            <a:ext cx="8503920" cy="274320"/>
+          </a:xfrm>
+          <a:prstGeom prst="rect">
+            <a:avLst/>
+          </a:prstGeom>
+          <a:noFill/>
+        </p:spPr>
+        <p:txBody>
+          <a:bodyPr wrap="square">
+            <a:spAutoFit/>
+          </a:bodyPr>
+          <a:lstStyle/>
+          <a:p>
+            <a:pPr algn="ctr">
+              <a:defRPr sz="1200" b="0">
                 <a:solidFill>
                   <a:srgbClr val="FFFFFF"/>
                 </a:solidFill>
@@ -7428,8 +7428,8 @@
         </p:nvSpPr>
         <p:spPr>
           <a:xfrm>
-            <a:off x="274320" y="1005840"/>
-            <a:ext cx="8595360" cy="1645920"/>
+            <a:off x="274320" y="1097280"/>
+            <a:ext cx="8595360" cy="1463040"/>
           </a:xfrm>
           <a:prstGeom prst="roundRect">
             <a:avLst/>
@@ -7471,8 +7471,8 @@
         </p:nvSpPr>
         <p:spPr>
           <a:xfrm>
-            <a:off x="274320" y="1005840"/>
-            <a:ext cx="73152" cy="1645920"/>
+            <a:off x="274320" y="1097280"/>
+            <a:ext cx="73152" cy="1463040"/>
           </a:xfrm>
           <a:prstGeom prst="roundRect">
             <a:avLst/>
@@ -7514,7 +7514,7 @@
         </p:nvSpPr>
         <p:spPr>
           <a:xfrm>
-            <a:off x="457200" y="1097280"/>
+            <a:off x="457200" y="1188720"/>
             <a:ext cx="8229600" cy="274320"/>
           </a:xfrm>
           <a:prstGeom prst="rect">
@@ -7550,8 +7550,8 @@
         </p:nvSpPr>
         <p:spPr>
           <a:xfrm>
-            <a:off x="457200" y="1417320"/>
-            <a:ext cx="8229600" cy="1097280"/>
+            <a:off x="457200" y="1463040"/>
+            <a:ext cx="8229600" cy="1005840"/>
           </a:xfrm>
           <a:prstGeom prst="rect">
             <a:avLst/>
@@ -7565,7 +7565,7 @@
           <a:lstStyle/>
           <a:p>
             <a:pPr algn="l">
-              <a:defRPr sz="1400" b="0">
+              <a:defRPr sz="1300" b="0">
                 <a:solidFill>
                   <a:srgbClr val="2D3748"/>
                 </a:solidFill>
@@ -7598,8 +7598,8 @@
         </p:nvSpPr>
         <p:spPr>
           <a:xfrm>
-            <a:off x="274320" y="2788920"/>
-            <a:ext cx="4206240" cy="1097280"/>
+            <a:off x="274320" y="2697480"/>
+            <a:ext cx="4206240" cy="1005840"/>
           </a:xfrm>
           <a:prstGeom prst="roundRect">
             <a:avLst/>
@@ -7641,7 +7641,7 @@
         </p:nvSpPr>
         <p:spPr>
           <a:xfrm>
-            <a:off x="457200" y="2880360"/>
+            <a:off x="457200" y="2788920"/>
             <a:ext cx="3931920" cy="228600"/>
           </a:xfrm>
           <a:prstGeom prst="rect">
@@ -7677,8 +7677,8 @@
         </p:nvSpPr>
         <p:spPr>
           <a:xfrm>
-            <a:off x="457200" y="3154680"/>
-            <a:ext cx="3931920" cy="685800"/>
+            <a:off x="457200" y="3017520"/>
+            <a:ext cx="3931920" cy="640080"/>
           </a:xfrm>
           <a:prstGeom prst="rect">
             <a:avLst/>
@@ -7692,7 +7692,7 @@
           <a:lstStyle/>
           <a:p>
             <a:pPr algn="l">
-              <a:defRPr sz="1100" b="0">
+              <a:defRPr sz="1000" b="0">
                 <a:solidFill>
                   <a:srgbClr val="2D3748"/>
                 </a:solidFill>
@@ -7725,8 +7725,8 @@
         </p:nvSpPr>
         <p:spPr>
           <a:xfrm>
-            <a:off x="4663440" y="2788920"/>
-            <a:ext cx="4206240" cy="1097280"/>
+            <a:off x="4663440" y="2697480"/>
+            <a:ext cx="4206240" cy="1005840"/>
           </a:xfrm>
           <a:prstGeom prst="roundRect">
             <a:avLst/>
@@ -7768,7 +7768,7 @@
         </p:nvSpPr>
         <p:spPr>
           <a:xfrm>
-            <a:off x="4846320" y="2880360"/>
+            <a:off x="4846320" y="2788920"/>
             <a:ext cx="3840480" cy="228600"/>
           </a:xfrm>
           <a:prstGeom prst="rect">
@@ -7804,8 +7804,8 @@
         </p:nvSpPr>
         <p:spPr>
           <a:xfrm>
-            <a:off x="4846320" y="3154680"/>
-            <a:ext cx="3840480" cy="685800"/>
+            <a:off x="4846320" y="3017520"/>
+            <a:ext cx="3840480" cy="640080"/>
           </a:xfrm>
           <a:prstGeom prst="rect">
             <a:avLst/>
@@ -7819,7 +7819,7 @@
           <a:lstStyle/>
           <a:p>
             <a:pPr algn="l">
-              <a:defRPr sz="1100" b="0">
+              <a:defRPr sz="1000" b="0">
                 <a:solidFill>
                   <a:srgbClr val="2D3748"/>
                 </a:solidFill>
@@ -7852,8 +7852,8 @@
         </p:nvSpPr>
         <p:spPr>
           <a:xfrm>
-            <a:off x="137160" y="4023360"/>
-            <a:ext cx="8869680" cy="640080"/>
+            <a:off x="137160" y="3840480"/>
+            <a:ext cx="8869680" cy="594360"/>
           </a:xfrm>
           <a:prstGeom prst="roundRect">
             <a:avLst/>
@@ -7895,8 +7895,8 @@
         </p:nvSpPr>
         <p:spPr>
           <a:xfrm>
-            <a:off x="320040" y="4114800"/>
-            <a:ext cx="8503920" cy="457200"/>
+            <a:off x="320040" y="3931920"/>
+            <a:ext cx="8503920" cy="411480"/>
           </a:xfrm>
           <a:prstGeom prst="rect">
             <a:avLst/>
@@ -7910,7 +7910,7 @@
           <a:lstStyle/>
           <a:p>
             <a:pPr algn="ctr">
-              <a:defRPr sz="1400" b="1">
+              <a:defRPr sz="1300" b="1">
                 <a:solidFill>
                   <a:srgbClr val="FFFFFF"/>
                 </a:solidFill>
@@ -9691,7 +9691,7 @@
           <a:lstStyle/>
           <a:p>
             <a:pPr algn="ctr">
-              <a:defRPr sz="2800" b="1">
+              <a:defRPr sz="2400" b="1">
                 <a:solidFill>
                   <a:srgbClr val="3182CE"/>
                 </a:solidFill>
@@ -12390,7 +12390,7 @@
         <p:spPr>
           <a:xfrm>
             <a:off x="137160" y="137160"/>
-            <a:ext cx="8869680" cy="685800"/>
+            <a:ext cx="8869680" cy="777240"/>
           </a:xfrm>
           <a:prstGeom prst="roundRect">
             <a:avLst/>
@@ -12432,8 +12432,8 @@
         </p:nvSpPr>
         <p:spPr>
           <a:xfrm>
-            <a:off x="320040" y="228600"/>
-            <a:ext cx="8503920" cy="502920"/>
+            <a:off x="320040" y="182880"/>
+            <a:ext cx="8503920" cy="411480"/>
           </a:xfrm>
           <a:prstGeom prst="rect">
             <a:avLst/>
@@ -12447,7 +12447,7 @@
           <a:lstStyle/>
           <a:p>
             <a:pPr algn="ctr">
-              <a:defRPr sz="2800" b="1">
+              <a:defRPr sz="2600" b="1">
                 <a:solidFill>
                   <a:srgbClr val="FFFFFF"/>
                 </a:solidFill>
@@ -12468,21 +12468,21 @@
         </p:nvSpPr>
         <p:spPr>
           <a:xfrm>
-            <a:off x="6858000" y="502920"/>
-            <a:ext cx="1828800" cy="274320"/>
-          </a:xfrm>
-          <a:prstGeom prst="rect">
-            <a:avLst/>
-          </a:prstGeom>
-          <a:noFill/>
-        </p:spPr>
-        <p:txBody>
-          <a:bodyPr wrap="square">
-            <a:spAutoFit/>
-          </a:bodyPr>
-          <a:lstStyle/>
-          <a:p>
-            <a:pPr algn="l">
+            <a:off x="320040" y="594360"/>
+            <a:ext cx="8503920" cy="274320"/>
+          </a:xfrm>
+          <a:prstGeom prst="rect">
+            <a:avLst/>
+          </a:prstGeom>
+          <a:noFill/>
+        </p:spPr>
+        <p:txBody>
+          <a:bodyPr wrap="square">
+            <a:spAutoFit/>
+          </a:bodyPr>
+          <a:lstStyle/>
+          <a:p>
+            <a:pPr algn="ctr">
               <a:defRPr sz="1100" b="0">
                 <a:solidFill>
                   <a:srgbClr val="FFFFFF"/>
@@ -13850,7 +13850,7 @@
         <p:spPr>
           <a:xfrm>
             <a:off x="137160" y="137160"/>
-            <a:ext cx="8869680" cy="685800"/>
+            <a:ext cx="8869680" cy="777240"/>
           </a:xfrm>
           <a:prstGeom prst="roundRect">
             <a:avLst/>
@@ -13892,8 +13892,8 @@
         </p:nvSpPr>
         <p:spPr>
           <a:xfrm>
-            <a:off x="320040" y="228600"/>
-            <a:ext cx="8503920" cy="502920"/>
+            <a:off x="320040" y="182880"/>
+            <a:ext cx="8503920" cy="411480"/>
           </a:xfrm>
           <a:prstGeom prst="rect">
             <a:avLst/>
@@ -13907,7 +13907,7 @@
           <a:lstStyle/>
           <a:p>
             <a:pPr algn="ctr">
-              <a:defRPr sz="2800" b="1">
+              <a:defRPr sz="2600" b="1">
                 <a:solidFill>
                   <a:srgbClr val="FFFFFF"/>
                 </a:solidFill>
@@ -13928,21 +13928,21 @@
         </p:nvSpPr>
         <p:spPr>
           <a:xfrm>
-            <a:off x="6858000" y="502920"/>
-            <a:ext cx="1828800" cy="274320"/>
-          </a:xfrm>
-          <a:prstGeom prst="rect">
-            <a:avLst/>
-          </a:prstGeom>
-          <a:noFill/>
-        </p:spPr>
-        <p:txBody>
-          <a:bodyPr wrap="square">
-            <a:spAutoFit/>
-          </a:bodyPr>
-          <a:lstStyle/>
-          <a:p>
-            <a:pPr algn="l">
+            <a:off x="320040" y="594360"/>
+            <a:ext cx="8503920" cy="274320"/>
+          </a:xfrm>
+          <a:prstGeom prst="rect">
+            <a:avLst/>
+          </a:prstGeom>
+          <a:noFill/>
+        </p:spPr>
+        <p:txBody>
+          <a:bodyPr wrap="square">
+            <a:spAutoFit/>
+          </a:bodyPr>
+          <a:lstStyle/>
+          <a:p>
+            <a:pPr algn="ctr">
               <a:defRPr sz="1100" b="0">
                 <a:solidFill>
                   <a:srgbClr val="FFFFFF"/>

</xml_diff>

<commit_message>
Add PPTX embed to student page and fix slide formatting issues
- Add embedded slides viewer as collapsible spoiler feature in student-page.html
- Convert plain text ALBEDO REFERENCE DATA to proper table format (Slide 10)
- Increase WORD BANK text size from default to 18pt for better readability
- Add emojis to enhance visual emphasis on key terms (ice, sunlight, water, hotter)
</commit_message>
<xml_diff>
--- a/content/grade7/cycle03/week2/G7_C3_W2_Feedback_Loops_Slides_Final.pptx
+++ b/content/grade7/cycle03/week2/G7_C3_W2_Feedback_Loops_Slides_Final.pptx
@@ -3712,23 +3712,23 @@
               </a:defRPr>
             </a:pPr>
             <a:r>
-              <a:t>Surface        | Start | After 3 min | Change</a:t>
+              <a:t/>
             </a:r>
             <a:br/>
             <a:r>
-              <a:t>Black surface (ocean)   | 22°C  | 38°C        | +16°C</a:t>
+              <a:t/>
             </a:r>
             <a:br/>
             <a:r>
-              <a:t>Water          | 22°C  | 31°C        | +9°C</a:t>
+              <a:t/>
             </a:r>
             <a:br/>
             <a:r>
-              <a:t>White surface (clouds)   | 22°C  | 27°C        | +5°C</a:t>
+              <a:t/>
             </a:r>
             <a:br/>
             <a:r>
-              <a:t>Ice/Snow | 22°C  | 24°C        | +2°C</a:t>
+              <a:t/>
             </a:r>
           </a:p>
         </p:txBody>
@@ -3843,7 +3843,7 @@
               </a:defRPr>
             </a:pPr>
             <a:r>
-              <a:t>• "Black surface (ocean) heated most because its albedo is low, which means..."</a:t>
+              <a:t>• "Black surface (ocean) 🔥 heated most because its albedo is low, which means..."</a:t>
             </a:r>
             <a:br/>
             <a:r>
@@ -3966,6 +3966,7 @@
               </a:defRPr>
             </a:pPr>
             <a:r>
+              <a:rPr sz="1800" b="1"/>
               <a:t>reflects • absorbs • albedo • light energy • temperature • feedback • amplify • positive feedback</a:t>
             </a:r>
           </a:p>
@@ -4045,7 +4046,7 @@
               </a:defRPr>
             </a:pPr>
             <a:r>
-              <a:t>🔑 KEY INSIGHT: When ice melts → dark ocean exposed → absorbs MORE heat → MORE melting = POSITIVE FEEDBACK!</a:t>
+              <a:t>🔑 KEY INSIGHT: When 🧊 ice melts → 🌊 dark ocean exposed → absorbs 🔥 MORE heat → MORE melting = POSITIVE FEEDBACK!</a:t>
             </a:r>
           </a:p>
         </p:txBody>
@@ -4124,11 +4125,420 @@
               </a:defRPr>
             </a:pPr>
             <a:r>
-              <a:t>📝 Notecard: Which surface heated most? How does this explain accelerating ice melt?</a:t>
-            </a:r>
-          </a:p>
-        </p:txBody>
-      </p:sp>
+              <a:t>📝 Notecard: Which surface 🔥 heated most? How does this explain accelerating ice melt?</a:t>
+            </a:r>
+          </a:p>
+        </p:txBody>
+      </p:sp>
+      <p:graphicFrame>
+        <p:nvGraphicFramePr>
+          <p:cNvPr id="21" name="Table 20"/>
+          <p:cNvGraphicFramePr>
+            <a:graphicFrameLocks noGrp="1"/>
+          </p:cNvGraphicFramePr>
+          <p:nvPr/>
+        </p:nvGraphicFramePr>
+        <p:xfrm>
+          <a:off x="4846320" y="1188720"/>
+          <a:ext cx="3840480" cy="1524000"/>
+        </p:xfrm>
+        <a:graphic>
+          <a:graphicData uri="http://schemas.openxmlformats.org/drawingml/2006/table">
+            <a:tbl>
+              <a:tblPr firstRow="1" bandRow="1">
+                <a:tableStyleId>{5C22544A-7EE6-4342-B048-85BDC9FD1C3A}</a:tableStyleId>
+              </a:tblPr>
+              <a:tblGrid>
+                <a:gridCol w="768096"/>
+                <a:gridCol w="768096"/>
+                <a:gridCol w="768096"/>
+                <a:gridCol w="768096"/>
+                <a:gridCol w="768096"/>
+              </a:tblGrid>
+              <a:tr h="304800">
+                <a:tc>
+                  <a:txBody>
+                    <a:bodyPr/>
+                    <a:lstStyle/>
+                    <a:p>
+                      <a:pPr algn="ctr"/>
+                      <a:r>
+                        <a:rPr b="1" sz="1000"/>
+                        <a:t>Surface</a:t>
+                      </a:r>
+                    </a:p>
+                  </a:txBody>
+                  <a:tcPr>
+                    <a:solidFill>
+                      <a:schemeClr val="accent1"/>
+                    </a:solidFill>
+                  </a:tcPr>
+                </a:tc>
+                <a:tc>
+                  <a:txBody>
+                    <a:bodyPr/>
+                    <a:lstStyle/>
+                    <a:p>
+                      <a:pPr algn="ctr"/>
+                      <a:r>
+                        <a:rPr b="1" sz="1000"/>
+                        <a:t>Albedo</a:t>
+                      </a:r>
+                    </a:p>
+                  </a:txBody>
+                  <a:tcPr>
+                    <a:solidFill>
+                      <a:schemeClr val="accent1"/>
+                    </a:solidFill>
+                  </a:tcPr>
+                </a:tc>
+                <a:tc>
+                  <a:txBody>
+                    <a:bodyPr/>
+                    <a:lstStyle/>
+                    <a:p>
+                      <a:pPr algn="ctr"/>
+                      <a:r>
+                        <a:rPr b="1" sz="1000"/>
+                        <a:t>Start</a:t>
+                      </a:r>
+                    </a:p>
+                  </a:txBody>
+                  <a:tcPr>
+                    <a:solidFill>
+                      <a:schemeClr val="accent1"/>
+                    </a:solidFill>
+                  </a:tcPr>
+                </a:tc>
+                <a:tc>
+                  <a:txBody>
+                    <a:bodyPr/>
+                    <a:lstStyle/>
+                    <a:p>
+                      <a:pPr algn="ctr"/>
+                      <a:r>
+                        <a:rPr b="1" sz="1000"/>
+                        <a:t>After 3 min</a:t>
+                      </a:r>
+                    </a:p>
+                  </a:txBody>
+                  <a:tcPr>
+                    <a:solidFill>
+                      <a:schemeClr val="accent1"/>
+                    </a:solidFill>
+                  </a:tcPr>
+                </a:tc>
+                <a:tc>
+                  <a:txBody>
+                    <a:bodyPr/>
+                    <a:lstStyle/>
+                    <a:p>
+                      <a:pPr algn="ctr"/>
+                      <a:r>
+                        <a:rPr b="1" sz="1000"/>
+                        <a:t>Change</a:t>
+                      </a:r>
+                    </a:p>
+                  </a:txBody>
+                  <a:tcPr>
+                    <a:solidFill>
+                      <a:schemeClr val="accent1"/>
+                    </a:solidFill>
+                  </a:tcPr>
+                </a:tc>
+              </a:tr>
+              <a:tr h="304800">
+                <a:tc>
+                  <a:txBody>
+                    <a:bodyPr/>
+                    <a:lstStyle/>
+                    <a:p>
+                      <a:pPr algn="ctr"/>
+                      <a:r>
+                        <a:rPr sz="900"/>
+                        <a:t>Black surface (ocean)</a:t>
+                      </a:r>
+                    </a:p>
+                  </a:txBody>
+                  <a:tcPr/>
+                </a:tc>
+                <a:tc>
+                  <a:txBody>
+                    <a:bodyPr/>
+                    <a:lstStyle/>
+                    <a:p>
+                      <a:pPr algn="ctr"/>
+                      <a:r>
+                        <a:rPr sz="900"/>
+                        <a:t>~0.06</a:t>
+                      </a:r>
+                    </a:p>
+                  </a:txBody>
+                  <a:tcPr/>
+                </a:tc>
+                <a:tc>
+                  <a:txBody>
+                    <a:bodyPr/>
+                    <a:lstStyle/>
+                    <a:p>
+                      <a:pPr algn="ctr"/>
+                      <a:r>
+                        <a:rPr sz="900"/>
+                        <a:t>22°C</a:t>
+                      </a:r>
+                    </a:p>
+                  </a:txBody>
+                  <a:tcPr/>
+                </a:tc>
+                <a:tc>
+                  <a:txBody>
+                    <a:bodyPr/>
+                    <a:lstStyle/>
+                    <a:p>
+                      <a:pPr algn="ctr"/>
+                      <a:r>
+                        <a:rPr sz="900"/>
+                        <a:t>38°C</a:t>
+                      </a:r>
+                    </a:p>
+                  </a:txBody>
+                  <a:tcPr/>
+                </a:tc>
+                <a:tc>
+                  <a:txBody>
+                    <a:bodyPr/>
+                    <a:lstStyle/>
+                    <a:p>
+                      <a:pPr algn="ctr"/>
+                      <a:r>
+                        <a:rPr sz="900" b="1"/>
+                        <a:t>+16°C</a:t>
+                      </a:r>
+                    </a:p>
+                  </a:txBody>
+                  <a:tcPr/>
+                </a:tc>
+              </a:tr>
+              <a:tr h="304800">
+                <a:tc>
+                  <a:txBody>
+                    <a:bodyPr/>
+                    <a:lstStyle/>
+                    <a:p>
+                      <a:pPr algn="ctr"/>
+                      <a:r>
+                        <a:rPr sz="900"/>
+                        <a:t>Water</a:t>
+                      </a:r>
+                    </a:p>
+                  </a:txBody>
+                  <a:tcPr/>
+                </a:tc>
+                <a:tc>
+                  <a:txBody>
+                    <a:bodyPr/>
+                    <a:lstStyle/>
+                    <a:p>
+                      <a:pPr algn="ctr"/>
+                      <a:r>
+                        <a:rPr sz="900"/>
+                        <a:t>~0.10</a:t>
+                      </a:r>
+                    </a:p>
+                  </a:txBody>
+                  <a:tcPr/>
+                </a:tc>
+                <a:tc>
+                  <a:txBody>
+                    <a:bodyPr/>
+                    <a:lstStyle/>
+                    <a:p>
+                      <a:pPr algn="ctr"/>
+                      <a:r>
+                        <a:rPr sz="900"/>
+                        <a:t>22°C</a:t>
+                      </a:r>
+                    </a:p>
+                  </a:txBody>
+                  <a:tcPr/>
+                </a:tc>
+                <a:tc>
+                  <a:txBody>
+                    <a:bodyPr/>
+                    <a:lstStyle/>
+                    <a:p>
+                      <a:pPr algn="ctr"/>
+                      <a:r>
+                        <a:rPr sz="900"/>
+                        <a:t>31°C</a:t>
+                      </a:r>
+                    </a:p>
+                  </a:txBody>
+                  <a:tcPr/>
+                </a:tc>
+                <a:tc>
+                  <a:txBody>
+                    <a:bodyPr/>
+                    <a:lstStyle/>
+                    <a:p>
+                      <a:pPr algn="ctr"/>
+                      <a:r>
+                        <a:rPr sz="900" b="1"/>
+                        <a:t>+9°C</a:t>
+                      </a:r>
+                    </a:p>
+                  </a:txBody>
+                  <a:tcPr/>
+                </a:tc>
+              </a:tr>
+              <a:tr h="304800">
+                <a:tc>
+                  <a:txBody>
+                    <a:bodyPr/>
+                    <a:lstStyle/>
+                    <a:p>
+                      <a:pPr algn="ctr"/>
+                      <a:r>
+                        <a:rPr sz="900"/>
+                        <a:t>White surface (clouds)</a:t>
+                      </a:r>
+                    </a:p>
+                  </a:txBody>
+                  <a:tcPr/>
+                </a:tc>
+                <a:tc>
+                  <a:txBody>
+                    <a:bodyPr/>
+                    <a:lstStyle/>
+                    <a:p>
+                      <a:pPr algn="ctr"/>
+                      <a:r>
+                        <a:rPr sz="900"/>
+                        <a:t>~0.70</a:t>
+                      </a:r>
+                    </a:p>
+                  </a:txBody>
+                  <a:tcPr/>
+                </a:tc>
+                <a:tc>
+                  <a:txBody>
+                    <a:bodyPr/>
+                    <a:lstStyle/>
+                    <a:p>
+                      <a:pPr algn="ctr"/>
+                      <a:r>
+                        <a:rPr sz="900"/>
+                        <a:t>22°C</a:t>
+                      </a:r>
+                    </a:p>
+                  </a:txBody>
+                  <a:tcPr/>
+                </a:tc>
+                <a:tc>
+                  <a:txBody>
+                    <a:bodyPr/>
+                    <a:lstStyle/>
+                    <a:p>
+                      <a:pPr algn="ctr"/>
+                      <a:r>
+                        <a:rPr sz="900"/>
+                        <a:t>27°C</a:t>
+                      </a:r>
+                    </a:p>
+                  </a:txBody>
+                  <a:tcPr/>
+                </a:tc>
+                <a:tc>
+                  <a:txBody>
+                    <a:bodyPr/>
+                    <a:lstStyle/>
+                    <a:p>
+                      <a:pPr algn="ctr"/>
+                      <a:r>
+                        <a:rPr sz="900" b="1"/>
+                        <a:t>+5°C</a:t>
+                      </a:r>
+                    </a:p>
+                  </a:txBody>
+                  <a:tcPr/>
+                </a:tc>
+              </a:tr>
+              <a:tr h="304800">
+                <a:tc>
+                  <a:txBody>
+                    <a:bodyPr/>
+                    <a:lstStyle/>
+                    <a:p>
+                      <a:pPr algn="ctr"/>
+                      <a:r>
+                        <a:rPr sz="900"/>
+                        <a:t>Ice/Snow</a:t>
+                      </a:r>
+                    </a:p>
+                  </a:txBody>
+                  <a:tcPr/>
+                </a:tc>
+                <a:tc>
+                  <a:txBody>
+                    <a:bodyPr/>
+                    <a:lstStyle/>
+                    <a:p>
+                      <a:pPr algn="ctr"/>
+                      <a:r>
+                        <a:rPr sz="900"/>
+                        <a:t>~0.85</a:t>
+                      </a:r>
+                    </a:p>
+                  </a:txBody>
+                  <a:tcPr/>
+                </a:tc>
+                <a:tc>
+                  <a:txBody>
+                    <a:bodyPr/>
+                    <a:lstStyle/>
+                    <a:p>
+                      <a:pPr algn="ctr"/>
+                      <a:r>
+                        <a:rPr sz="900"/>
+                        <a:t>22°C</a:t>
+                      </a:r>
+                    </a:p>
+                  </a:txBody>
+                  <a:tcPr/>
+                </a:tc>
+                <a:tc>
+                  <a:txBody>
+                    <a:bodyPr/>
+                    <a:lstStyle/>
+                    <a:p>
+                      <a:pPr algn="ctr"/>
+                      <a:r>
+                        <a:rPr sz="900"/>
+                        <a:t>24°C</a:t>
+                      </a:r>
+                    </a:p>
+                  </a:txBody>
+                  <a:tcPr/>
+                </a:tc>
+                <a:tc>
+                  <a:txBody>
+                    <a:bodyPr/>
+                    <a:lstStyle/>
+                    <a:p>
+                      <a:pPr algn="ctr"/>
+                      <a:r>
+                        <a:rPr sz="900" b="1"/>
+                        <a:t>+2°C</a:t>
+                      </a:r>
+                    </a:p>
+                  </a:txBody>
+                  <a:tcPr/>
+                </a:tc>
+              </a:tr>
+            </a:tbl>
+          </a:graphicData>
+        </a:graphic>
+      </p:graphicFrame>
     </p:spTree>
   </p:cSld>
   <p:clrMapOvr>
@@ -8951,7 +9361,7 @@
             </a:r>
             <a:br/>
             <a:r>
-              <a:t>• The more ice that melts, the FASTER remaining ice melts</a:t>
+              <a:t>• The more ice that melts, the FASTER remaining 🧊 ice melts</a:t>
             </a:r>
             <a:br/>
             <a:br/>
@@ -9035,7 +9445,7 @@
               </a:defRPr>
             </a:pPr>
             <a:r>
-              <a:t>Why would melting cause MORE melting?</a:t>
+              <a:t>Why would melting cause 🧊 MORE melting?</a:t>
             </a:r>
           </a:p>
         </p:txBody>
@@ -9481,7 +9891,7 @@
               </a:defRPr>
             </a:pPr>
             <a:r>
-              <a:t>Why might melting ice cause MORE melting?</a:t>
+              <a:t>Why might melting ice cause 🧊 MORE melting?</a:t>
             </a:r>
             <a:br/>
             <a:r>
@@ -12787,7 +13197,7 @@
             </a:r>
             <a:br/>
             <a:r>
-              <a:t>Which absorbs more sunlight?</a:t>
+              <a:t>Which absorbs more ☀️ sunlight?</a:t>
             </a:r>
           </a:p>
         </p:txBody>
@@ -13272,7 +13682,7 @@
               </a:defRPr>
             </a:pPr>
             <a:r>
-              <a:t>White/light - reflects most sunlight</a:t>
+              <a:t>⬜ White/light - reflects most ☀️ sunlight</a:t>
             </a:r>
           </a:p>
         </p:txBody>
@@ -13351,7 +13761,7 @@
               </a:defRPr>
             </a:pPr>
             <a:r>
-              <a:t>What color is ocean water?</a:t>
+              <a:t>What color is 🌊 ocean water?</a:t>
             </a:r>
           </a:p>
         </p:txBody>
@@ -13387,7 +13797,7 @@
               </a:defRPr>
             </a:pPr>
             <a:r>
-              <a:t>Dark blue - absorbs most sunlight</a:t>
+              <a:t>🌊 Dark blue - absorbs most ☀️ sunlight</a:t>
             </a:r>
           </a:p>
         </p:txBody>
@@ -13466,7 +13876,7 @@
               </a:defRPr>
             </a:pPr>
             <a:r>
-              <a:t>Which surface heats up more?</a:t>
+              <a:t>Which surface 🔥 heats up more?</a:t>
             </a:r>
           </a:p>
         </p:txBody>
@@ -13502,7 +13912,7 @@
               </a:defRPr>
             </a:pPr>
             <a:r>
-              <a:t>Dark surfaces absorb more → get hotter!</a:t>
+              <a:t>Dark surfaces absorb more → get 🔥 hotter!</a:t>
             </a:r>
           </a:p>
         </p:txBody>
@@ -13660,7 +14070,7 @@
               </a:defRPr>
             </a:pPr>
             <a:r>
-              <a:t>Last week: CO₂ absorbs infrared heat → warms atmosphere → ice melts. This week: What happens AFTER ice melts?</a:t>
+              <a:t>Last week: CO₂ absorbs infrared heat → warms atmosphere → 🧊 ice melts. This week: What happens AFTER 🧊 ice melts?</a:t>
             </a:r>
           </a:p>
         </p:txBody>
@@ -13739,7 +14149,7 @@
               </a:defRPr>
             </a:pPr>
             <a:r>
-              <a:t>🔄 THE LOOP: More CO₂ → More heat → Ice melts → Dark ocean exposed → Absorbs MORE heat → MORE ice melts → ...</a:t>
+              <a:t>🔄 THE LOOP: More CO₂ → More heat → Ice melts → Dark ocean exposed → Absorbs 🔥 MORE heat → MORE 🧊 ice melts → ...</a:t>
             </a:r>
           </a:p>
         </p:txBody>

</xml_diff>

<commit_message>
Fix albedo table overlap on slide 10 in G7_C3_W2 PPTX
Reduced table row heights from 304800 to 200000 EMUs to prevent
the albedo reference table from overlapping the WORD BANK box below it.
</commit_message>
<xml_diff>
--- a/content/grade7/cycle03/week2/G7_C3_W2_Feedback_Loops_Slides_Final.pptx
+++ b/content/grade7/cycle03/week2/G7_C3_W2_Feedback_Loops_Slides_Final.pptx
@@ -4140,7 +4140,7 @@
         </p:nvGraphicFramePr>
         <p:xfrm>
           <a:off x="4846320" y="1188720"/>
-          <a:ext cx="3840480" cy="1524000"/>
+          <a:ext cx="3840480" cy="1000000"/>
         </p:xfrm>
         <a:graphic>
           <a:graphicData uri="http://schemas.openxmlformats.org/drawingml/2006/table">
@@ -4155,7 +4155,7 @@
                 <a:gridCol w="768096"/>
                 <a:gridCol w="768096"/>
               </a:tblGrid>
-              <a:tr h="304800">
+              <a:tr h="200000">
                 <a:tc>
                   <a:txBody>
                     <a:bodyPr/>
@@ -4247,7 +4247,7 @@
                   </a:tcPr>
                 </a:tc>
               </a:tr>
-              <a:tr h="304800">
+              <a:tr h="200000">
                 <a:tc>
                   <a:txBody>
                     <a:bodyPr/>
@@ -4319,7 +4319,7 @@
                   <a:tcPr/>
                 </a:tc>
               </a:tr>
-              <a:tr h="304800">
+              <a:tr h="200000">
                 <a:tc>
                   <a:txBody>
                     <a:bodyPr/>
@@ -4391,7 +4391,7 @@
                   <a:tcPr/>
                 </a:tc>
               </a:tr>
-              <a:tr h="304800">
+              <a:tr h="200000">
                 <a:tc>
                   <a:txBody>
                     <a:bodyPr/>
@@ -4463,7 +4463,7 @@
                   <a:tcPr/>
                 </a:tc>
               </a:tr>
-              <a:tr h="304800">
+              <a:tr h="200000">
                 <a:tc>
                   <a:txBody>
                     <a:bodyPr/>

</xml_diff>

<commit_message>
Fix text layout and centering issues in G7/G8 C3 W2 presentations
Comprehensive fixes for vertical text centering across both scripts:
- Added anchor=MSO_ANCHOR.MIDDLE for proper vertical alignment
- Fixed vocabulary table text boxes in both G7 and G8
- Fixed stats display boxes in Learning Targets slides
- Fixed Station 1 comparison table in G8 (header and rows)
- Fixed Station 2 timeline table in G8 (header and rows)
- Fixed Station 3 options table in G7
- Fixed Exit Ticket tip boxes and final notecard sections
- Increased text box heights where needed to prevent overflow
- Adjusted text positioning offsets for better centering

Also added best practices documentation sections 7 and 8 to G7 script:
- Table row text alignment guidelines
- Stat/number display box guidelines
</commit_message>
<xml_diff>
--- a/content/grade7/cycle03/week2/G7_C3_W2_Feedback_Loops_Slides_Final.pptx
+++ b/content/grade7/cycle03/week2/G7_C3_W2_Feedback_Loops_Slides_Final.pptx
@@ -3676,7 +3676,7 @@
               </a:defRPr>
             </a:pPr>
             <a:r>
-              <a:t>📊 ALBEDO REFERENCE DATA:</a:t>
+              <a:t>🏠 HOME ALTERNATIVE DATA:</a:t>
             </a:r>
           </a:p>
         </p:txBody>
@@ -3712,23 +3712,23 @@
               </a:defRPr>
             </a:pPr>
             <a:r>
-              <a:t/>
+              <a:t>Surface        | Start | After 3 min | Change</a:t>
             </a:r>
             <a:br/>
             <a:r>
-              <a:t/>
+              <a:t>Black paper   | 22°C  | 38°C        | +16°C</a:t>
             </a:r>
             <a:br/>
             <a:r>
-              <a:t/>
+              <a:t>Water          | 22°C  | 31°C        | +9°C</a:t>
             </a:r>
             <a:br/>
             <a:r>
-              <a:t/>
+              <a:t>White paper   | 22°C  | 27°C        | +5°C</a:t>
             </a:r>
             <a:br/>
             <a:r>
-              <a:t/>
+              <a:t>Aluminum foil | 22°C  | 24°C        | +2°C</a:t>
             </a:r>
           </a:p>
         </p:txBody>
@@ -3843,11 +3843,11 @@
               </a:defRPr>
             </a:pPr>
             <a:r>
-              <a:t>• "Black surface (ocean) 🔥 heated most because its albedo is low, which means..."</a:t>
+              <a:t>• "Black paper heated most because its albedo is low, which means..."</a:t>
             </a:r>
             <a:br/>
             <a:r>
-              <a:t>• "Surfaces with high albedo, like ice and snow, stayed cooler because..."</a:t>
+              <a:t>• "Surfaces with high albedo, like aluminum, stayed cooler because..."</a:t>
             </a:r>
             <a:br/>
             <a:r>
@@ -3966,7 +3966,6 @@
               </a:defRPr>
             </a:pPr>
             <a:r>
-              <a:rPr sz="1800" b="1"/>
               <a:t>reflects • absorbs • albedo • light energy • temperature • feedback • amplify • positive feedback</a:t>
             </a:r>
           </a:p>
@@ -4046,7 +4045,7 @@
               </a:defRPr>
             </a:pPr>
             <a:r>
-              <a:t>🔑 KEY INSIGHT: When 🧊 ice melts → 🌊 dark ocean exposed → absorbs 🔥 MORE heat → MORE melting = POSITIVE FEEDBACK!</a:t>
+              <a:t>🔑 KEY INSIGHT: When ice melts → dark ocean exposed → absorbs MORE heat → MORE melting = POSITIVE FEEDBACK!</a:t>
             </a:r>
           </a:p>
         </p:txBody>
@@ -4125,420 +4124,11 @@
               </a:defRPr>
             </a:pPr>
             <a:r>
-              <a:t>📝 Notecard: Which surface 🔥 heated most? How does this explain accelerating ice melt?</a:t>
-            </a:r>
-          </a:p>
-        </p:txBody>
-      </p:sp>
-      <p:graphicFrame>
-        <p:nvGraphicFramePr>
-          <p:cNvPr id="21" name="Table 20"/>
-          <p:cNvGraphicFramePr>
-            <a:graphicFrameLocks noGrp="1"/>
-          </p:cNvGraphicFramePr>
-          <p:nvPr/>
-        </p:nvGraphicFramePr>
-        <p:xfrm>
-          <a:off x="4846320" y="1188720"/>
-          <a:ext cx="3840480" cy="1000000"/>
-        </p:xfrm>
-        <a:graphic>
-          <a:graphicData uri="http://schemas.openxmlformats.org/drawingml/2006/table">
-            <a:tbl>
-              <a:tblPr firstRow="1" bandRow="1">
-                <a:tableStyleId>{5C22544A-7EE6-4342-B048-85BDC9FD1C3A}</a:tableStyleId>
-              </a:tblPr>
-              <a:tblGrid>
-                <a:gridCol w="768096"/>
-                <a:gridCol w="768096"/>
-                <a:gridCol w="768096"/>
-                <a:gridCol w="768096"/>
-                <a:gridCol w="768096"/>
-              </a:tblGrid>
-              <a:tr h="200000">
-                <a:tc>
-                  <a:txBody>
-                    <a:bodyPr/>
-                    <a:lstStyle/>
-                    <a:p>
-                      <a:pPr algn="ctr"/>
-                      <a:r>
-                        <a:rPr b="1" sz="1000"/>
-                        <a:t>Surface</a:t>
-                      </a:r>
-                    </a:p>
-                  </a:txBody>
-                  <a:tcPr>
-                    <a:solidFill>
-                      <a:schemeClr val="accent1"/>
-                    </a:solidFill>
-                  </a:tcPr>
-                </a:tc>
-                <a:tc>
-                  <a:txBody>
-                    <a:bodyPr/>
-                    <a:lstStyle/>
-                    <a:p>
-                      <a:pPr algn="ctr"/>
-                      <a:r>
-                        <a:rPr b="1" sz="1000"/>
-                        <a:t>Albedo</a:t>
-                      </a:r>
-                    </a:p>
-                  </a:txBody>
-                  <a:tcPr>
-                    <a:solidFill>
-                      <a:schemeClr val="accent1"/>
-                    </a:solidFill>
-                  </a:tcPr>
-                </a:tc>
-                <a:tc>
-                  <a:txBody>
-                    <a:bodyPr/>
-                    <a:lstStyle/>
-                    <a:p>
-                      <a:pPr algn="ctr"/>
-                      <a:r>
-                        <a:rPr b="1" sz="1000"/>
-                        <a:t>Start</a:t>
-                      </a:r>
-                    </a:p>
-                  </a:txBody>
-                  <a:tcPr>
-                    <a:solidFill>
-                      <a:schemeClr val="accent1"/>
-                    </a:solidFill>
-                  </a:tcPr>
-                </a:tc>
-                <a:tc>
-                  <a:txBody>
-                    <a:bodyPr/>
-                    <a:lstStyle/>
-                    <a:p>
-                      <a:pPr algn="ctr"/>
-                      <a:r>
-                        <a:rPr b="1" sz="1000"/>
-                        <a:t>After 3 min</a:t>
-                      </a:r>
-                    </a:p>
-                  </a:txBody>
-                  <a:tcPr>
-                    <a:solidFill>
-                      <a:schemeClr val="accent1"/>
-                    </a:solidFill>
-                  </a:tcPr>
-                </a:tc>
-                <a:tc>
-                  <a:txBody>
-                    <a:bodyPr/>
-                    <a:lstStyle/>
-                    <a:p>
-                      <a:pPr algn="ctr"/>
-                      <a:r>
-                        <a:rPr b="1" sz="1000"/>
-                        <a:t>Change</a:t>
-                      </a:r>
-                    </a:p>
-                  </a:txBody>
-                  <a:tcPr>
-                    <a:solidFill>
-                      <a:schemeClr val="accent1"/>
-                    </a:solidFill>
-                  </a:tcPr>
-                </a:tc>
-              </a:tr>
-              <a:tr h="200000">
-                <a:tc>
-                  <a:txBody>
-                    <a:bodyPr/>
-                    <a:lstStyle/>
-                    <a:p>
-                      <a:pPr algn="ctr"/>
-                      <a:r>
-                        <a:rPr sz="900"/>
-                        <a:t>Black surface (ocean)</a:t>
-                      </a:r>
-                    </a:p>
-                  </a:txBody>
-                  <a:tcPr/>
-                </a:tc>
-                <a:tc>
-                  <a:txBody>
-                    <a:bodyPr/>
-                    <a:lstStyle/>
-                    <a:p>
-                      <a:pPr algn="ctr"/>
-                      <a:r>
-                        <a:rPr sz="900"/>
-                        <a:t>~0.06</a:t>
-                      </a:r>
-                    </a:p>
-                  </a:txBody>
-                  <a:tcPr/>
-                </a:tc>
-                <a:tc>
-                  <a:txBody>
-                    <a:bodyPr/>
-                    <a:lstStyle/>
-                    <a:p>
-                      <a:pPr algn="ctr"/>
-                      <a:r>
-                        <a:rPr sz="900"/>
-                        <a:t>22°C</a:t>
-                      </a:r>
-                    </a:p>
-                  </a:txBody>
-                  <a:tcPr/>
-                </a:tc>
-                <a:tc>
-                  <a:txBody>
-                    <a:bodyPr/>
-                    <a:lstStyle/>
-                    <a:p>
-                      <a:pPr algn="ctr"/>
-                      <a:r>
-                        <a:rPr sz="900"/>
-                        <a:t>38°C</a:t>
-                      </a:r>
-                    </a:p>
-                  </a:txBody>
-                  <a:tcPr/>
-                </a:tc>
-                <a:tc>
-                  <a:txBody>
-                    <a:bodyPr/>
-                    <a:lstStyle/>
-                    <a:p>
-                      <a:pPr algn="ctr"/>
-                      <a:r>
-                        <a:rPr sz="900" b="1"/>
-                        <a:t>+16°C</a:t>
-                      </a:r>
-                    </a:p>
-                  </a:txBody>
-                  <a:tcPr/>
-                </a:tc>
-              </a:tr>
-              <a:tr h="200000">
-                <a:tc>
-                  <a:txBody>
-                    <a:bodyPr/>
-                    <a:lstStyle/>
-                    <a:p>
-                      <a:pPr algn="ctr"/>
-                      <a:r>
-                        <a:rPr sz="900"/>
-                        <a:t>Water</a:t>
-                      </a:r>
-                    </a:p>
-                  </a:txBody>
-                  <a:tcPr/>
-                </a:tc>
-                <a:tc>
-                  <a:txBody>
-                    <a:bodyPr/>
-                    <a:lstStyle/>
-                    <a:p>
-                      <a:pPr algn="ctr"/>
-                      <a:r>
-                        <a:rPr sz="900"/>
-                        <a:t>~0.10</a:t>
-                      </a:r>
-                    </a:p>
-                  </a:txBody>
-                  <a:tcPr/>
-                </a:tc>
-                <a:tc>
-                  <a:txBody>
-                    <a:bodyPr/>
-                    <a:lstStyle/>
-                    <a:p>
-                      <a:pPr algn="ctr"/>
-                      <a:r>
-                        <a:rPr sz="900"/>
-                        <a:t>22°C</a:t>
-                      </a:r>
-                    </a:p>
-                  </a:txBody>
-                  <a:tcPr/>
-                </a:tc>
-                <a:tc>
-                  <a:txBody>
-                    <a:bodyPr/>
-                    <a:lstStyle/>
-                    <a:p>
-                      <a:pPr algn="ctr"/>
-                      <a:r>
-                        <a:rPr sz="900"/>
-                        <a:t>31°C</a:t>
-                      </a:r>
-                    </a:p>
-                  </a:txBody>
-                  <a:tcPr/>
-                </a:tc>
-                <a:tc>
-                  <a:txBody>
-                    <a:bodyPr/>
-                    <a:lstStyle/>
-                    <a:p>
-                      <a:pPr algn="ctr"/>
-                      <a:r>
-                        <a:rPr sz="900" b="1"/>
-                        <a:t>+9°C</a:t>
-                      </a:r>
-                    </a:p>
-                  </a:txBody>
-                  <a:tcPr/>
-                </a:tc>
-              </a:tr>
-              <a:tr h="200000">
-                <a:tc>
-                  <a:txBody>
-                    <a:bodyPr/>
-                    <a:lstStyle/>
-                    <a:p>
-                      <a:pPr algn="ctr"/>
-                      <a:r>
-                        <a:rPr sz="900"/>
-                        <a:t>White surface (clouds)</a:t>
-                      </a:r>
-                    </a:p>
-                  </a:txBody>
-                  <a:tcPr/>
-                </a:tc>
-                <a:tc>
-                  <a:txBody>
-                    <a:bodyPr/>
-                    <a:lstStyle/>
-                    <a:p>
-                      <a:pPr algn="ctr"/>
-                      <a:r>
-                        <a:rPr sz="900"/>
-                        <a:t>~0.70</a:t>
-                      </a:r>
-                    </a:p>
-                  </a:txBody>
-                  <a:tcPr/>
-                </a:tc>
-                <a:tc>
-                  <a:txBody>
-                    <a:bodyPr/>
-                    <a:lstStyle/>
-                    <a:p>
-                      <a:pPr algn="ctr"/>
-                      <a:r>
-                        <a:rPr sz="900"/>
-                        <a:t>22°C</a:t>
-                      </a:r>
-                    </a:p>
-                  </a:txBody>
-                  <a:tcPr/>
-                </a:tc>
-                <a:tc>
-                  <a:txBody>
-                    <a:bodyPr/>
-                    <a:lstStyle/>
-                    <a:p>
-                      <a:pPr algn="ctr"/>
-                      <a:r>
-                        <a:rPr sz="900"/>
-                        <a:t>27°C</a:t>
-                      </a:r>
-                    </a:p>
-                  </a:txBody>
-                  <a:tcPr/>
-                </a:tc>
-                <a:tc>
-                  <a:txBody>
-                    <a:bodyPr/>
-                    <a:lstStyle/>
-                    <a:p>
-                      <a:pPr algn="ctr"/>
-                      <a:r>
-                        <a:rPr sz="900" b="1"/>
-                        <a:t>+5°C</a:t>
-                      </a:r>
-                    </a:p>
-                  </a:txBody>
-                  <a:tcPr/>
-                </a:tc>
-              </a:tr>
-              <a:tr h="200000">
-                <a:tc>
-                  <a:txBody>
-                    <a:bodyPr/>
-                    <a:lstStyle/>
-                    <a:p>
-                      <a:pPr algn="ctr"/>
-                      <a:r>
-                        <a:rPr sz="900"/>
-                        <a:t>Ice/Snow</a:t>
-                      </a:r>
-                    </a:p>
-                  </a:txBody>
-                  <a:tcPr/>
-                </a:tc>
-                <a:tc>
-                  <a:txBody>
-                    <a:bodyPr/>
-                    <a:lstStyle/>
-                    <a:p>
-                      <a:pPr algn="ctr"/>
-                      <a:r>
-                        <a:rPr sz="900"/>
-                        <a:t>~0.85</a:t>
-                      </a:r>
-                    </a:p>
-                  </a:txBody>
-                  <a:tcPr/>
-                </a:tc>
-                <a:tc>
-                  <a:txBody>
-                    <a:bodyPr/>
-                    <a:lstStyle/>
-                    <a:p>
-                      <a:pPr algn="ctr"/>
-                      <a:r>
-                        <a:rPr sz="900"/>
-                        <a:t>22°C</a:t>
-                      </a:r>
-                    </a:p>
-                  </a:txBody>
-                  <a:tcPr/>
-                </a:tc>
-                <a:tc>
-                  <a:txBody>
-                    <a:bodyPr/>
-                    <a:lstStyle/>
-                    <a:p>
-                      <a:pPr algn="ctr"/>
-                      <a:r>
-                        <a:rPr sz="900"/>
-                        <a:t>24°C</a:t>
-                      </a:r>
-                    </a:p>
-                  </a:txBody>
-                  <a:tcPr/>
-                </a:tc>
-                <a:tc>
-                  <a:txBody>
-                    <a:bodyPr/>
-                    <a:lstStyle/>
-                    <a:p>
-                      <a:pPr algn="ctr"/>
-                      <a:r>
-                        <a:rPr sz="900" b="1"/>
-                        <a:t>+2°C</a:t>
-                      </a:r>
-                    </a:p>
-                  </a:txBody>
-                  <a:tcPr/>
-                </a:tc>
-              </a:tr>
-            </a:tbl>
-          </a:graphicData>
-        </a:graphic>
-      </p:graphicFrame>
+              <a:t>📝 Notecard: Which surface heated most? How does this explain accelerating ice melt?</a:t>
+            </a:r>
+          </a:p>
+        </p:txBody>
+      </p:sp>
     </p:spTree>
   </p:cSld>
   <p:clrMapOvr>
@@ -6815,8 +6405,8 @@
         </p:nvSpPr>
         <p:spPr>
           <a:xfrm>
-            <a:off x="365760" y="868680"/>
-            <a:ext cx="2286000" cy="320040"/>
+            <a:off x="365760" y="822960"/>
+            <a:ext cx="2286000" cy="411480"/>
           </a:xfrm>
           <a:prstGeom prst="rect">
             <a:avLst/>
@@ -6851,8 +6441,8 @@
         </p:nvSpPr>
         <p:spPr>
           <a:xfrm>
-            <a:off x="2743200" y="868680"/>
-            <a:ext cx="3200400" cy="320040"/>
+            <a:off x="2743200" y="822960"/>
+            <a:ext cx="3200400" cy="411480"/>
           </a:xfrm>
           <a:prstGeom prst="rect">
             <a:avLst/>
@@ -6887,8 +6477,8 @@
         </p:nvSpPr>
         <p:spPr>
           <a:xfrm>
-            <a:off x="6400800" y="868680"/>
-            <a:ext cx="2286000" cy="320040"/>
+            <a:off x="6400800" y="822960"/>
+            <a:ext cx="2286000" cy="411480"/>
           </a:xfrm>
           <a:prstGeom prst="rect">
             <a:avLst/>
@@ -6966,8 +6556,8 @@
         </p:nvSpPr>
         <p:spPr>
           <a:xfrm>
-            <a:off x="365760" y="1371600"/>
-            <a:ext cx="2286000" cy="320040"/>
+            <a:off x="365760" y="1325880"/>
+            <a:ext cx="2286000" cy="411480"/>
           </a:xfrm>
           <a:prstGeom prst="rect">
             <a:avLst/>
@@ -7002,8 +6592,8 @@
         </p:nvSpPr>
         <p:spPr>
           <a:xfrm>
-            <a:off x="2743200" y="1371600"/>
-            <a:ext cx="3200400" cy="320040"/>
+            <a:off x="2743200" y="1325880"/>
+            <a:ext cx="3200400" cy="411480"/>
           </a:xfrm>
           <a:prstGeom prst="rect">
             <a:avLst/>
@@ -7038,8 +6628,8 @@
         </p:nvSpPr>
         <p:spPr>
           <a:xfrm>
-            <a:off x="6400800" y="1371600"/>
-            <a:ext cx="2286000" cy="320040"/>
+            <a:off x="6400800" y="1325880"/>
+            <a:ext cx="2286000" cy="411480"/>
           </a:xfrm>
           <a:prstGeom prst="rect">
             <a:avLst/>
@@ -7117,8 +6707,8 @@
         </p:nvSpPr>
         <p:spPr>
           <a:xfrm>
-            <a:off x="365760" y="1874519"/>
-            <a:ext cx="2286000" cy="320040"/>
+            <a:off x="365760" y="1828800"/>
+            <a:ext cx="2286000" cy="411480"/>
           </a:xfrm>
           <a:prstGeom prst="rect">
             <a:avLst/>
@@ -7153,8 +6743,8 @@
         </p:nvSpPr>
         <p:spPr>
           <a:xfrm>
-            <a:off x="2743200" y="1874519"/>
-            <a:ext cx="3200400" cy="320040"/>
+            <a:off x="2743200" y="1828800"/>
+            <a:ext cx="3200400" cy="411480"/>
           </a:xfrm>
           <a:prstGeom prst="rect">
             <a:avLst/>
@@ -7189,8 +6779,8 @@
         </p:nvSpPr>
         <p:spPr>
           <a:xfrm>
-            <a:off x="6400800" y="1874519"/>
-            <a:ext cx="2286000" cy="320040"/>
+            <a:off x="6400800" y="1828800"/>
+            <a:ext cx="2286000" cy="411480"/>
           </a:xfrm>
           <a:prstGeom prst="rect">
             <a:avLst/>
@@ -7268,8 +6858,8 @@
         </p:nvSpPr>
         <p:spPr>
           <a:xfrm>
-            <a:off x="365760" y="2377440"/>
-            <a:ext cx="2286000" cy="320040"/>
+            <a:off x="365760" y="2331720"/>
+            <a:ext cx="2286000" cy="411480"/>
           </a:xfrm>
           <a:prstGeom prst="rect">
             <a:avLst/>
@@ -7304,8 +6894,8 @@
         </p:nvSpPr>
         <p:spPr>
           <a:xfrm>
-            <a:off x="2743200" y="2377440"/>
-            <a:ext cx="3200400" cy="320040"/>
+            <a:off x="2743200" y="2331720"/>
+            <a:ext cx="3200400" cy="411480"/>
           </a:xfrm>
           <a:prstGeom prst="rect">
             <a:avLst/>
@@ -7340,8 +6930,8 @@
         </p:nvSpPr>
         <p:spPr>
           <a:xfrm>
-            <a:off x="6400800" y="2377440"/>
-            <a:ext cx="2286000" cy="320040"/>
+            <a:off x="6400800" y="2331720"/>
+            <a:ext cx="2286000" cy="411480"/>
           </a:xfrm>
           <a:prstGeom prst="rect">
             <a:avLst/>
@@ -8009,7 +7599,7 @@
         <p:spPr>
           <a:xfrm>
             <a:off x="274320" y="2697480"/>
-            <a:ext cx="4206240" cy="1005840"/>
+            <a:ext cx="4206240" cy="1097280"/>
           </a:xfrm>
           <a:prstGeom prst="roundRect">
             <a:avLst/>
@@ -8051,8 +7641,8 @@
         </p:nvSpPr>
         <p:spPr>
           <a:xfrm>
-            <a:off x="457200" y="2788920"/>
-            <a:ext cx="3931920" cy="228600"/>
+            <a:off x="457200" y="2743200"/>
+            <a:ext cx="3931920" cy="274320"/>
           </a:xfrm>
           <a:prstGeom prst="rect">
             <a:avLst/>
@@ -8088,7 +7678,7 @@
         <p:spPr>
           <a:xfrm>
             <a:off x="457200" y="3017520"/>
-            <a:ext cx="3931920" cy="640080"/>
+            <a:ext cx="3931920" cy="731520"/>
           </a:xfrm>
           <a:prstGeom prst="rect">
             <a:avLst/>
@@ -8136,7 +7726,7 @@
         <p:spPr>
           <a:xfrm>
             <a:off x="4663440" y="2697480"/>
-            <a:ext cx="4206240" cy="1005840"/>
+            <a:ext cx="4206240" cy="1097280"/>
           </a:xfrm>
           <a:prstGeom prst="roundRect">
             <a:avLst/>
@@ -8178,8 +7768,8 @@
         </p:nvSpPr>
         <p:spPr>
           <a:xfrm>
-            <a:off x="4846320" y="2788920"/>
-            <a:ext cx="3840480" cy="228600"/>
+            <a:off x="4846320" y="2743200"/>
+            <a:ext cx="3840480" cy="274320"/>
           </a:xfrm>
           <a:prstGeom prst="rect">
             <a:avLst/>
@@ -8215,7 +7805,7 @@
         <p:spPr>
           <a:xfrm>
             <a:off x="4846320" y="3017520"/>
-            <a:ext cx="3840480" cy="640080"/>
+            <a:ext cx="3840480" cy="731520"/>
           </a:xfrm>
           <a:prstGeom prst="rect">
             <a:avLst/>
@@ -8305,8 +7895,8 @@
         </p:nvSpPr>
         <p:spPr>
           <a:xfrm>
-            <a:off x="320040" y="3931920"/>
-            <a:ext cx="8503920" cy="411480"/>
+            <a:off x="320040" y="3886200"/>
+            <a:ext cx="8503920" cy="502920"/>
           </a:xfrm>
           <a:prstGeom prst="rect">
             <a:avLst/>
@@ -9361,7 +8951,7 @@
             </a:r>
             <a:br/>
             <a:r>
-              <a:t>• The more ice that melts, the FASTER remaining 🧊 ice melts</a:t>
+              <a:t>• The more ice that melts, the FASTER remaining ice melts</a:t>
             </a:r>
             <a:br/>
             <a:br/>
@@ -9445,7 +9035,7 @@
               </a:defRPr>
             </a:pPr>
             <a:r>
-              <a:t>Why would melting cause 🧊 MORE melting?</a:t>
+              <a:t>Why would melting cause MORE melting?</a:t>
             </a:r>
           </a:p>
         </p:txBody>
@@ -9891,7 +9481,7 @@
               </a:defRPr>
             </a:pPr>
             <a:r>
-              <a:t>Why might melting ice cause 🧊 MORE melting?</a:t>
+              <a:t>Why might melting ice cause MORE melting?</a:t>
             </a:r>
             <a:br/>
             <a:r>
@@ -11656,8 +11246,8 @@
         </p:nvSpPr>
         <p:spPr>
           <a:xfrm>
-            <a:off x="1371600" y="3383280"/>
-            <a:ext cx="1371600" cy="457200"/>
+            <a:off x="1371600" y="3337560"/>
+            <a:ext cx="1371600" cy="320040"/>
           </a:xfrm>
           <a:prstGeom prst="rect">
             <a:avLst/>
@@ -11728,8 +11318,8 @@
         </p:nvSpPr>
         <p:spPr>
           <a:xfrm>
-            <a:off x="3886200" y="3383280"/>
-            <a:ext cx="1371600" cy="457200"/>
+            <a:off x="3886200" y="3337560"/>
+            <a:ext cx="1371600" cy="320040"/>
           </a:xfrm>
           <a:prstGeom prst="rect">
             <a:avLst/>
@@ -11800,8 +11390,8 @@
         </p:nvSpPr>
         <p:spPr>
           <a:xfrm>
-            <a:off x="6400800" y="3383280"/>
-            <a:ext cx="1371600" cy="457200"/>
+            <a:off x="6400800" y="3337560"/>
+            <a:ext cx="1371600" cy="320040"/>
           </a:xfrm>
           <a:prstGeom prst="rect">
             <a:avLst/>
@@ -11915,8 +11505,8 @@
         </p:nvSpPr>
         <p:spPr>
           <a:xfrm>
-            <a:off x="457200" y="4206240"/>
-            <a:ext cx="8229600" cy="640080"/>
+            <a:off x="457200" y="4160520"/>
+            <a:ext cx="8229600" cy="731520"/>
           </a:xfrm>
           <a:prstGeom prst="rect">
             <a:avLst/>
@@ -12091,8 +11681,8 @@
         </p:nvSpPr>
         <p:spPr>
           <a:xfrm>
-            <a:off x="365760" y="822960"/>
-            <a:ext cx="2011680" cy="365760"/>
+            <a:off x="365760" y="804672"/>
+            <a:ext cx="2011680" cy="457200"/>
           </a:xfrm>
           <a:prstGeom prst="rect">
             <a:avLst/>
@@ -12127,8 +11717,8 @@
         </p:nvSpPr>
         <p:spPr>
           <a:xfrm>
-            <a:off x="2468880" y="822960"/>
-            <a:ext cx="6309360" cy="411480"/>
+            <a:off x="2468880" y="804672"/>
+            <a:ext cx="6309360" cy="457200"/>
           </a:xfrm>
           <a:prstGeom prst="rect">
             <a:avLst/>
@@ -12206,8 +11796,8 @@
         </p:nvSpPr>
         <p:spPr>
           <a:xfrm>
-            <a:off x="365760" y="1417320"/>
-            <a:ext cx="2011680" cy="365760"/>
+            <a:off x="365760" y="1399032"/>
+            <a:ext cx="2011680" cy="457200"/>
           </a:xfrm>
           <a:prstGeom prst="rect">
             <a:avLst/>
@@ -12242,8 +11832,8 @@
         </p:nvSpPr>
         <p:spPr>
           <a:xfrm>
-            <a:off x="2468880" y="1417320"/>
-            <a:ext cx="6309360" cy="411480"/>
+            <a:off x="2468880" y="1399032"/>
+            <a:ext cx="6309360" cy="457200"/>
           </a:xfrm>
           <a:prstGeom prst="rect">
             <a:avLst/>
@@ -12321,8 +11911,8 @@
         </p:nvSpPr>
         <p:spPr>
           <a:xfrm>
-            <a:off x="365760" y="2011680"/>
-            <a:ext cx="2011680" cy="365760"/>
+            <a:off x="365760" y="1993392"/>
+            <a:ext cx="2011680" cy="457200"/>
           </a:xfrm>
           <a:prstGeom prst="rect">
             <a:avLst/>
@@ -12357,8 +11947,8 @@
         </p:nvSpPr>
         <p:spPr>
           <a:xfrm>
-            <a:off x="2468880" y="2011680"/>
-            <a:ext cx="6309360" cy="411480"/>
+            <a:off x="2468880" y="1993392"/>
+            <a:ext cx="6309360" cy="457200"/>
           </a:xfrm>
           <a:prstGeom prst="rect">
             <a:avLst/>
@@ -12436,8 +12026,8 @@
         </p:nvSpPr>
         <p:spPr>
           <a:xfrm>
-            <a:off x="365760" y="2606040"/>
-            <a:ext cx="2011680" cy="365760"/>
+            <a:off x="365760" y="2587752"/>
+            <a:ext cx="2011680" cy="457200"/>
           </a:xfrm>
           <a:prstGeom prst="rect">
             <a:avLst/>
@@ -12472,8 +12062,8 @@
         </p:nvSpPr>
         <p:spPr>
           <a:xfrm>
-            <a:off x="2468880" y="2606040"/>
-            <a:ext cx="6309360" cy="411480"/>
+            <a:off x="2468880" y="2587752"/>
+            <a:ext cx="6309360" cy="457200"/>
           </a:xfrm>
           <a:prstGeom prst="rect">
             <a:avLst/>
@@ -12551,8 +12141,8 @@
         </p:nvSpPr>
         <p:spPr>
           <a:xfrm>
-            <a:off x="365760" y="3200400"/>
-            <a:ext cx="2011680" cy="365760"/>
+            <a:off x="365760" y="3182112"/>
+            <a:ext cx="2011680" cy="457200"/>
           </a:xfrm>
           <a:prstGeom prst="rect">
             <a:avLst/>
@@ -12587,8 +12177,8 @@
         </p:nvSpPr>
         <p:spPr>
           <a:xfrm>
-            <a:off x="2468880" y="3200400"/>
-            <a:ext cx="6309360" cy="411480"/>
+            <a:off x="2468880" y="3182112"/>
+            <a:ext cx="6309360" cy="457200"/>
           </a:xfrm>
           <a:prstGeom prst="rect">
             <a:avLst/>
@@ -13197,7 +12787,7 @@
             </a:r>
             <a:br/>
             <a:r>
-              <a:t>Which absorbs more ☀️ sunlight?</a:t>
+              <a:t>Which absorbs more sunlight?</a:t>
             </a:r>
           </a:p>
         </p:txBody>
@@ -13682,7 +13272,7 @@
               </a:defRPr>
             </a:pPr>
             <a:r>
-              <a:t>⬜ White/light - reflects most ☀️ sunlight</a:t>
+              <a:t>White/light - reflects most sunlight</a:t>
             </a:r>
           </a:p>
         </p:txBody>
@@ -13761,7 +13351,7 @@
               </a:defRPr>
             </a:pPr>
             <a:r>
-              <a:t>What color is 🌊 ocean water?</a:t>
+              <a:t>What color is ocean water?</a:t>
             </a:r>
           </a:p>
         </p:txBody>
@@ -13797,7 +13387,7 @@
               </a:defRPr>
             </a:pPr>
             <a:r>
-              <a:t>🌊 Dark blue - absorbs most ☀️ sunlight</a:t>
+              <a:t>Dark blue - absorbs most sunlight</a:t>
             </a:r>
           </a:p>
         </p:txBody>
@@ -13876,7 +13466,7 @@
               </a:defRPr>
             </a:pPr>
             <a:r>
-              <a:t>Which surface 🔥 heats up more?</a:t>
+              <a:t>Which surface heats up more?</a:t>
             </a:r>
           </a:p>
         </p:txBody>
@@ -13912,7 +13502,7 @@
               </a:defRPr>
             </a:pPr>
             <a:r>
-              <a:t>Dark surfaces absorb more → get 🔥 hotter!</a:t>
+              <a:t>Dark surfaces absorb more → get hotter!</a:t>
             </a:r>
           </a:p>
         </p:txBody>
@@ -14070,7 +13660,7 @@
               </a:defRPr>
             </a:pPr>
             <a:r>
-              <a:t>Last week: CO₂ absorbs infrared heat → warms atmosphere → 🧊 ice melts. This week: What happens AFTER 🧊 ice melts?</a:t>
+              <a:t>Last week: CO₂ absorbs infrared heat → warms atmosphere → ice melts. This week: What happens AFTER ice melts?</a:t>
             </a:r>
           </a:p>
         </p:txBody>
@@ -14149,7 +13739,7 @@
               </a:defRPr>
             </a:pPr>
             <a:r>
-              <a:t>🔄 THE LOOP: More CO₂ → More heat → Ice melts → Dark ocean exposed → Absorbs 🔥 MORE heat → MORE 🧊 ice melts → ...</a:t>
+              <a:t>🔄 THE LOOP: More CO₂ → More heat → Ice melts → Dark ocean exposed → Absorbs MORE heat → MORE ice melts → ...</a:t>
             </a:r>
           </a:p>
         </p:txBody>
@@ -14519,27 +14109,27 @@
               </a:defRPr>
             </a:pPr>
             <a:r>
-              <a:t>1. Open the Ice-Albedo Feedback Simulator (3 min)</a:t>
+              <a:t>1. Set up heat lamp with 4 surfaces (3 min)</a:t>
             </a:r>
             <a:br/>
             <a:r>
-              <a:t>   • Review the albedo reference data table</a:t>
+              <a:t>   • Black paper, white paper, aluminum foil, water</a:t>
             </a:r>
             <a:br/>
             <a:r>
-              <a:t>2. Analyze how different surfaces heat up (3 min)</a:t>
+              <a:t>2. Record starting temperatures (2 min)</a:t>
             </a:r>
             <a:br/>
             <a:r>
-              <a:t>3. Run the simulation to see feedback in action (5 min)</a:t>
+              <a:t>3. Turn on heat lamp for 3 minutes (3 min)</a:t>
             </a:r>
             <a:br/>
             <a:r>
-              <a:t>4. Note how ice loss affects temperature (3 min)</a:t>
+              <a:t>4. Record final temperatures (2 min)</a:t>
             </a:r>
             <a:br/>
             <a:r>
-              <a:t>5. Calculate temperature changes from data (2 min)</a:t>
+              <a:t>5. Calculate temperature changes (3 min)</a:t>
             </a:r>
             <a:br/>
             <a:r>
@@ -14859,11 +14449,11 @@
               </a:defRPr>
             </a:pPr>
             <a:r>
-              <a:t>💡 Tip: Use the simulation controls to explore different scenarios</a:t>
+              <a:t>⚠️ Safety: Do NOT touch heat lamp bulb!</a:t>
             </a:r>
             <a:br/>
             <a:r>
-              <a:t/>
+              <a:t>Keep water away from electrical equipment</a:t>
             </a:r>
           </a:p>
         </p:txBody>

</xml_diff>

<commit_message>
Remove unnecessary decorative elements from PPTX generation scripts
- Remove decorative white divider lines from Driving Question slides
- Simplify teaser boxes by removing border styling (line.color.rgb, line.width)
- Simplify mission boxes by removing decorative borders
- Regenerate all 10 PPTX files with cleaner formatting

Modified scripts:
- create_g7_c3_w2_pptx.py
- create_g7_c3_w3_pptx.py
- create_g8_c3_w2_pptx.py
- create_g8_c3_w3_pptx.py
</commit_message>
<xml_diff>
--- a/content/grade7/cycle03/week2/G7_C3_W2_Feedback_Loops_Slides_Final.pptx
+++ b/content/grade7/cycle03/week2/G7_C3_W2_Feedback_Loops_Slides_Final.pptx
@@ -3271,10 +3271,8 @@
           <a:solidFill>
             <a:srgbClr val="FFFFFF"/>
           </a:solidFill>
-          <a:ln w="25400">
-            <a:solidFill>
-              <a:srgbClr val="38B2AC"/>
-            </a:solidFill>
+          <a:ln>
+            <a:noFill/>
           </a:ln>
         </p:spPr>
         <p:style>
@@ -9492,20 +9490,56 @@
       </p:sp>
       <p:sp>
         <p:nvSpPr>
-          <p:cNvPr id="5" name="Rounded Rectangle 4"/>
+          <p:cNvPr id="5" name="TextBox 4"/>
+          <p:cNvSpPr txBox="1"/>
+          <p:nvPr/>
+        </p:nvSpPr>
+        <p:spPr>
+          <a:xfrm>
+            <a:off x="914400" y="3200400"/>
+            <a:ext cx="7315200" cy="548640"/>
+          </a:xfrm>
+          <a:prstGeom prst="rect">
+            <a:avLst/>
+          </a:prstGeom>
+          <a:noFill/>
+        </p:spPr>
+        <p:txBody>
+          <a:bodyPr wrap="square">
+            <a:spAutoFit/>
+          </a:bodyPr>
+          <a:lstStyle/>
+          <a:p>
+            <a:pPr algn="ctr">
+              <a:defRPr sz="2000" b="0">
+                <a:solidFill>
+                  <a:srgbClr val="FFFFFF"/>
+                </a:solidFill>
+                <a:latin typeface="Georgia"/>
+              </a:defRPr>
+            </a:pPr>
+            <a:r>
+              <a:t>And how does this connect to what you learned about CO₂ in Week 1?</a:t>
+            </a:r>
+          </a:p>
+        </p:txBody>
+      </p:sp>
+      <p:sp>
+        <p:nvSpPr>
+          <p:cNvPr id="6" name="Rounded Rectangle 5"/>
           <p:cNvSpPr/>
           <p:nvPr/>
         </p:nvSpPr>
         <p:spPr>
           <a:xfrm>
-            <a:off x="3657600" y="2926080"/>
-            <a:ext cx="1828800" cy="73152"/>
+            <a:off x="1828800" y="3931920"/>
+            <a:ext cx="5486400" cy="731520"/>
           </a:xfrm>
           <a:prstGeom prst="roundRect">
             <a:avLst/>
           </a:prstGeom>
           <a:solidFill>
-            <a:srgbClr val="FFFFFF"/>
+            <a:srgbClr val="234E52"/>
           </a:solidFill>
           <a:ln>
             <a:noFill/>
@@ -9535,88 +9569,7 @@
       </p:sp>
       <p:sp>
         <p:nvSpPr>
-          <p:cNvPr id="6" name="TextBox 5"/>
-          <p:cNvSpPr txBox="1"/>
-          <p:nvPr/>
-        </p:nvSpPr>
-        <p:spPr>
-          <a:xfrm>
-            <a:off x="914400" y="3200400"/>
-            <a:ext cx="7315200" cy="548640"/>
-          </a:xfrm>
-          <a:prstGeom prst="rect">
-            <a:avLst/>
-          </a:prstGeom>
-          <a:noFill/>
-        </p:spPr>
-        <p:txBody>
-          <a:bodyPr wrap="square">
-            <a:spAutoFit/>
-          </a:bodyPr>
-          <a:lstStyle/>
-          <a:p>
-            <a:pPr algn="ctr">
-              <a:defRPr sz="2000" b="0">
-                <a:solidFill>
-                  <a:srgbClr val="FFFFFF"/>
-                </a:solidFill>
-                <a:latin typeface="Georgia"/>
-              </a:defRPr>
-            </a:pPr>
-            <a:r>
-              <a:t>And how does this connect to what you learned about CO₂ in Week 1?</a:t>
-            </a:r>
-          </a:p>
-        </p:txBody>
-      </p:sp>
-      <p:sp>
-        <p:nvSpPr>
-          <p:cNvPr id="7" name="Rounded Rectangle 6"/>
-          <p:cNvSpPr/>
-          <p:nvPr/>
-        </p:nvSpPr>
-        <p:spPr>
-          <a:xfrm>
-            <a:off x="1828800" y="3931920"/>
-            <a:ext cx="5486400" cy="731520"/>
-          </a:xfrm>
-          <a:prstGeom prst="roundRect">
-            <a:avLst/>
-          </a:prstGeom>
-          <a:solidFill>
-            <a:srgbClr val="234E52"/>
-          </a:solidFill>
-          <a:ln w="25400">
-            <a:solidFill>
-              <a:srgbClr val="FFFFFF"/>
-            </a:solidFill>
-          </a:ln>
-        </p:spPr>
-        <p:style>
-          <a:lnRef idx="1">
-            <a:schemeClr val="accent1"/>
-          </a:lnRef>
-          <a:fillRef idx="3">
-            <a:schemeClr val="accent1"/>
-          </a:fillRef>
-          <a:effectRef idx="2">
-            <a:schemeClr val="accent1"/>
-          </a:effectRef>
-          <a:fontRef idx="minor">
-            <a:schemeClr val="lt1"/>
-          </a:fontRef>
-        </p:style>
-        <p:txBody>
-          <a:bodyPr rtlCol="0" anchor="ctr"/>
-          <a:lstStyle/>
-          <a:p>
-            <a:pPr algn="ctr"/>
-          </a:p>
-        </p:txBody>
-      </p:sp>
-      <p:sp>
-        <p:nvSpPr>
-          <p:cNvPr id="8" name="TextBox 7"/>
+          <p:cNvPr id="7" name="TextBox 6"/>
           <p:cNvSpPr txBox="1"/>
           <p:nvPr/>
         </p:nvSpPr>

</xml_diff>